<commit_message>
started adding materials for Module 06
</commit_message>
<xml_diff>
--- a/Slides/Lesson 6.2 Trees.pptx
+++ b/Slides/Lesson 6.2 Trees.pptx
@@ -228,7 +228,7 @@
           <a:p>
             <a:fld id="{1AC50D25-69DA-4251-A3B1-10895C6A89D6}" type="datetimeFigureOut">
               <a:rPr lang="en-US" smtClean="0"/>
-              <a:t>8/31/2015</a:t>
+              <a:t>10/13/2015</a:t>
             </a:fld>
             <a:endParaRPr lang="en-US"/>
           </a:p>
@@ -1094,7 +1094,7 @@
           <a:p>
             <a:fld id="{2F1F79F5-7BEC-496A-AFC7-876E38F64D71}" type="datetime1">
               <a:rPr lang="en-US" smtClean="0"/>
-              <a:t>8/31/2015</a:t>
+              <a:t>10/13/2015</a:t>
             </a:fld>
             <a:endParaRPr lang="en-US"/>
           </a:p>
@@ -1196,7 +1196,7 @@
           <a:p>
             <a:fld id="{0A05703A-7669-4FEA-9056-25299B4D29D4}" type="datetime1">
               <a:rPr lang="en-US" smtClean="0"/>
-              <a:t>8/31/2015</a:t>
+              <a:t>10/13/2015</a:t>
             </a:fld>
             <a:endParaRPr lang="en-US"/>
           </a:p>
@@ -1473,7 +1473,7 @@
           <a:p>
             <a:fld id="{6E5077B5-BB57-49DB-88CA-226A139E5C01}" type="datetime1">
               <a:rPr lang="en-US" smtClean="0"/>
-              <a:t>8/31/2015</a:t>
+              <a:t>10/13/2015</a:t>
             </a:fld>
             <a:endParaRPr lang="en-US"/>
           </a:p>
@@ -1726,7 +1726,7 @@
           <a:p>
             <a:fld id="{C48D9447-CBD6-49A1-89FD-8512A8CF8999}" type="datetime1">
               <a:rPr lang="en-US" smtClean="0"/>
-              <a:t>8/31/2015</a:t>
+              <a:t>10/13/2015</a:t>
             </a:fld>
             <a:endParaRPr lang="en-US"/>
           </a:p>
@@ -1896,7 +1896,7 @@
           <a:p>
             <a:fld id="{A3639A2A-823D-48B7-9ACE-7FAF42870BA9}" type="datetime1">
               <a:rPr lang="en-US" smtClean="0"/>
-              <a:t>8/31/2015</a:t>
+              <a:t>10/13/2015</a:t>
             </a:fld>
             <a:endParaRPr lang="en-US"/>
           </a:p>
@@ -2076,7 +2076,7 @@
           <a:p>
             <a:fld id="{ED1B6996-82E9-463C-972C-7B56056E426C}" type="datetime1">
               <a:rPr lang="en-US" smtClean="0"/>
-              <a:t>8/31/2015</a:t>
+              <a:t>10/13/2015</a:t>
             </a:fld>
             <a:endParaRPr lang="en-US"/>
           </a:p>
@@ -2259,7 +2259,7 @@
           <a:p>
             <a:fld id="{E22ED4DA-448D-4BB1-B935-CC112220207B}" type="datetime1">
               <a:rPr lang="en-US" smtClean="0"/>
-              <a:t>8/31/2015</a:t>
+              <a:t>10/13/2015</a:t>
             </a:fld>
             <a:endParaRPr lang="en-US"/>
           </a:p>
@@ -2441,7 +2441,7 @@
           <a:p>
             <a:fld id="{E22ED4DA-448D-4BB1-B935-CC112220207B}" type="datetime1">
               <a:rPr lang="en-US" smtClean="0"/>
-              <a:t>8/31/2015</a:t>
+              <a:t>10/13/2015</a:t>
             </a:fld>
             <a:endParaRPr lang="en-US"/>
           </a:p>
@@ -2710,7 +2710,7 @@
           <a:p>
             <a:fld id="{FF5D65A6-AB94-4435-B0B7-3743215FA46C}" type="datetime1">
               <a:rPr lang="en-US" smtClean="0"/>
-              <a:t>8/31/2015</a:t>
+              <a:t>10/13/2015</a:t>
             </a:fld>
             <a:endParaRPr lang="en-US"/>
           </a:p>
@@ -2895,7 +2895,7 @@
           <a:p>
             <a:fld id="{FF5D65A6-AB94-4435-B0B7-3743215FA46C}" type="datetime1">
               <a:rPr lang="en-US" smtClean="0"/>
-              <a:t>8/31/2015</a:t>
+              <a:t>10/13/2015</a:t>
             </a:fld>
             <a:endParaRPr lang="en-US"/>
           </a:p>
@@ -3197,7 +3197,7 @@
           <a:p>
             <a:fld id="{7C193DC4-6EF0-48C9-B29C-616106A645E1}" type="datetime1">
               <a:rPr lang="en-US" smtClean="0"/>
-              <a:t>8/31/2015</a:t>
+              <a:t>10/13/2015</a:t>
             </a:fld>
             <a:endParaRPr lang="en-US"/>
           </a:p>
@@ -3485,7 +3485,7 @@
           <a:p>
             <a:fld id="{5D1846AD-9252-4647-9435-4C2AC365653A}" type="datetime1">
               <a:rPr lang="en-US" smtClean="0"/>
-              <a:t>8/31/2015</a:t>
+              <a:t>10/13/2015</a:t>
             </a:fld>
             <a:endParaRPr lang="en-US"/>
           </a:p>
@@ -3907,7 +3907,7 @@
           <a:p>
             <a:fld id="{CE56DC10-3561-4063-A6AF-C1CC7A41040A}" type="datetime1">
               <a:rPr lang="en-US" smtClean="0"/>
-              <a:t>8/31/2015</a:t>
+              <a:t>10/13/2015</a:t>
             </a:fld>
             <a:endParaRPr lang="en-US"/>
           </a:p>
@@ -4025,7 +4025,7 @@
           <a:p>
             <a:fld id="{2F7B77F5-1464-4F6B-92A8-64FC8A508293}" type="datetime1">
               <a:rPr lang="en-US" smtClean="0"/>
-              <a:t>8/31/2015</a:t>
+              <a:t>10/13/2015</a:t>
             </a:fld>
             <a:endParaRPr lang="en-US"/>
           </a:p>
@@ -4257,7 +4257,7 @@
           <a:p>
             <a:fld id="{02B3F677-983B-48DB-ADFD-63FE6CBC7FB2}" type="datetime1">
               <a:rPr lang="en-US" smtClean="0"/>
-              <a:t>8/31/2015</a:t>
+              <a:t>10/13/2015</a:t>
             </a:fld>
             <a:endParaRPr lang="en-US"/>
           </a:p>
@@ -7987,7 +7987,23 @@
                   <a:schemeClr val="tx1"/>
                 </a:solidFill>
               </a:rPr>
-              <a:t>And here are the template questions.  When we write a function using structural decomposition, we fill in the template with the answers to these questions.</a:t>
+              <a:t>And here are the template questions.  When we write a function </a:t>
+            </a:r>
+            <a:r>
+              <a:rPr lang="en-US" dirty="0" smtClean="0">
+                <a:solidFill>
+                  <a:schemeClr val="tx1"/>
+                </a:solidFill>
+              </a:rPr>
+              <a:t>using the template, </a:t>
+            </a:r>
+            <a:r>
+              <a:rPr lang="en-US" dirty="0">
+                <a:solidFill>
+                  <a:schemeClr val="tx1"/>
+                </a:solidFill>
+              </a:rPr>
+              <a:t>we fill in the template with the answers to these questions.</a:t>
             </a:r>
           </a:p>
         </p:txBody>

</xml_diff>